<commit_message>
Præsentation + rapport opdateret
</commit_message>
<xml_diff>
--- a/F17-I4SWD-AfsluttendeOpgaveGruppe02-Mediator-presenstation.pptx
+++ b/F17-I4SWD-AfsluttendeOpgaveGruppe02-Mediator-presenstation.pptx
@@ -5,14 +5,16 @@
     <p:sldMasterId id="2147483648" r:id="rId1"/>
   </p:sldMasterIdLst>
   <p:notesMasterIdLst>
-    <p:notesMasterId r:id="rId7"/>
+    <p:notesMasterId r:id="rId9"/>
   </p:notesMasterIdLst>
   <p:sldIdLst>
     <p:sldId id="256" r:id="rId2"/>
     <p:sldId id="257" r:id="rId3"/>
-    <p:sldId id="258" r:id="rId4"/>
-    <p:sldId id="259" r:id="rId5"/>
-    <p:sldId id="260" r:id="rId6"/>
+    <p:sldId id="259" r:id="rId4"/>
+    <p:sldId id="261" r:id="rId5"/>
+    <p:sldId id="263" r:id="rId6"/>
+    <p:sldId id="262" r:id="rId7"/>
+    <p:sldId id="260" r:id="rId8"/>
   </p:sldIdLst>
   <p:sldSz cx="12192000" cy="6858000"/>
   <p:notesSz cx="6858000" cy="9144000"/>
@@ -201,7 +203,7 @@
           <a:p>
             <a:fld id="{2EAB6690-7453-43A9-9B51-7173FABB2D04}" type="datetimeFigureOut">
               <a:rPr lang="da-DK" smtClean="0"/>
-              <a:t>09-05-2017</a:t>
+              <a:t>10-05-2017</a:t>
             </a:fld>
             <a:endParaRPr lang="da-DK"/>
           </a:p>
@@ -684,7 +686,7 @@
           <a:p>
             <a:fld id="{D08B3943-9B2F-426B-B92E-F2981C0A6181}" type="datetime1">
               <a:rPr lang="da-DK" smtClean="0"/>
-              <a:t>09-05-2017</a:t>
+              <a:t>10-05-2017</a:t>
             </a:fld>
             <a:endParaRPr lang="da-DK"/>
           </a:p>
@@ -858,7 +860,7 @@
           <a:p>
             <a:fld id="{718912BF-B03B-4E20-BA58-081C4B8ADAD3}" type="datetime1">
               <a:rPr lang="da-DK" smtClean="0"/>
-              <a:t>09-05-2017</a:t>
+              <a:t>10-05-2017</a:t>
             </a:fld>
             <a:endParaRPr lang="da-DK"/>
           </a:p>
@@ -1042,7 +1044,7 @@
           <a:p>
             <a:fld id="{DFCF4D44-919B-4BDE-822F-51DCD8E7022C}" type="datetime1">
               <a:rPr lang="da-DK" smtClean="0"/>
-              <a:t>09-05-2017</a:t>
+              <a:t>10-05-2017</a:t>
             </a:fld>
             <a:endParaRPr lang="da-DK"/>
           </a:p>
@@ -1216,7 +1218,7 @@
           <a:p>
             <a:fld id="{C42D205E-0D83-4543-B19E-F08B0D72C1FB}" type="datetime1">
               <a:rPr lang="da-DK" smtClean="0"/>
-              <a:t>09-05-2017</a:t>
+              <a:t>10-05-2017</a:t>
             </a:fld>
             <a:endParaRPr lang="da-DK"/>
           </a:p>
@@ -1466,7 +1468,7 @@
           <a:p>
             <a:fld id="{0A331055-E5B5-4603-8567-56F8061424DC}" type="datetime1">
               <a:rPr lang="da-DK" smtClean="0"/>
-              <a:t>09-05-2017</a:t>
+              <a:t>10-05-2017</a:t>
             </a:fld>
             <a:endParaRPr lang="da-DK"/>
           </a:p>
@@ -1702,7 +1704,7 @@
           <a:p>
             <a:fld id="{C3EB175F-B746-4CFC-B0E1-B5A0054B0690}" type="datetime1">
               <a:rPr lang="da-DK" smtClean="0"/>
-              <a:t>09-05-2017</a:t>
+              <a:t>10-05-2017</a:t>
             </a:fld>
             <a:endParaRPr lang="da-DK"/>
           </a:p>
@@ -2073,7 +2075,7 @@
           <a:p>
             <a:fld id="{2F212514-4704-4AE6-964C-84C3C84C77EA}" type="datetime1">
               <a:rPr lang="da-DK" smtClean="0"/>
-              <a:t>09-05-2017</a:t>
+              <a:t>10-05-2017</a:t>
             </a:fld>
             <a:endParaRPr lang="da-DK"/>
           </a:p>
@@ -2195,7 +2197,7 @@
           <a:p>
             <a:fld id="{C8DDEEBF-178C-486F-A7C8-E4A22B107738}" type="datetime1">
               <a:rPr lang="da-DK" smtClean="0"/>
-              <a:t>09-05-2017</a:t>
+              <a:t>10-05-2017</a:t>
             </a:fld>
             <a:endParaRPr lang="da-DK"/>
           </a:p>
@@ -2294,7 +2296,7 @@
           <a:p>
             <a:fld id="{7EBC7135-28B9-44D1-AFE0-35F26429D83C}" type="datetime1">
               <a:rPr lang="da-DK" smtClean="0"/>
-              <a:t>09-05-2017</a:t>
+              <a:t>10-05-2017</a:t>
             </a:fld>
             <a:endParaRPr lang="da-DK"/>
           </a:p>
@@ -2575,7 +2577,7 @@
           <a:p>
             <a:fld id="{F39255D5-8824-491C-8009-EE21FE1B1D65}" type="datetime1">
               <a:rPr lang="da-DK" smtClean="0"/>
-              <a:t>09-05-2017</a:t>
+              <a:t>10-05-2017</a:t>
             </a:fld>
             <a:endParaRPr lang="da-DK"/>
           </a:p>
@@ -2832,7 +2834,7 @@
           <a:p>
             <a:fld id="{037B697C-EE37-4A26-8347-0DD73B267312}" type="datetime1">
               <a:rPr lang="da-DK" smtClean="0"/>
-              <a:t>09-05-2017</a:t>
+              <a:t>10-05-2017</a:t>
             </a:fld>
             <a:endParaRPr lang="da-DK"/>
           </a:p>
@@ -3049,7 +3051,7 @@
           <a:p>
             <a:fld id="{CCA65E36-09AC-4FB2-B38C-E877749D6C9B}" type="datetime1">
               <a:rPr lang="da-DK" smtClean="0"/>
-              <a:t>09-05-2017</a:t>
+              <a:t>10-05-2017</a:t>
             </a:fld>
             <a:endParaRPr lang="da-DK"/>
           </a:p>
@@ -3558,9 +3560,107 @@
           <a:chExt cx="0" cy="0"/>
         </a:xfrm>
       </p:grpSpPr>
+      <p:sp>
+        <p:nvSpPr>
+          <p:cNvPr id="2" name="Titel 1"/>
+          <p:cNvSpPr>
+            <a:spLocks noGrp="1"/>
+          </p:cNvSpPr>
+          <p:nvPr>
+            <p:ph type="title"/>
+          </p:nvPr>
+        </p:nvSpPr>
+        <p:spPr/>
+        <p:txBody>
+          <a:bodyPr/>
+          <a:lstStyle/>
+          <a:p>
+            <a:r>
+              <a:rPr lang="da-DK" dirty="0" smtClean="0"/>
+              <a:t>Introduktion</a:t>
+            </a:r>
+            <a:endParaRPr lang="da-DK" dirty="0"/>
+          </a:p>
+        </p:txBody>
+      </p:sp>
+      <p:sp>
+        <p:nvSpPr>
+          <p:cNvPr id="3" name="Pladsholder til indhold 2"/>
+          <p:cNvSpPr>
+            <a:spLocks noGrp="1"/>
+          </p:cNvSpPr>
+          <p:nvPr>
+            <p:ph idx="1"/>
+          </p:nvPr>
+        </p:nvSpPr>
+        <p:spPr>
+          <a:xfrm>
+            <a:off x="838200" y="1690688"/>
+            <a:ext cx="4757382" cy="4351338"/>
+          </a:xfrm>
+        </p:spPr>
+        <p:txBody>
+          <a:bodyPr/>
+          <a:lstStyle/>
+          <a:p>
+            <a:r>
+              <a:rPr lang="da-DK" dirty="0" smtClean="0"/>
+              <a:t>Håndterer kommunikation mellem objekter</a:t>
+            </a:r>
+          </a:p>
+          <a:p>
+            <a:r>
+              <a:rPr lang="da-DK" dirty="0" smtClean="0"/>
+              <a:t>Giver løs kobling</a:t>
+            </a:r>
+          </a:p>
+          <a:p>
+            <a:r>
+              <a:rPr lang="da-DK" dirty="0" smtClean="0"/>
+              <a:t>Objekterne kender ikke til hinanden</a:t>
+            </a:r>
+          </a:p>
+          <a:p>
+            <a:r>
+              <a:rPr lang="da-DK" dirty="0" smtClean="0"/>
+              <a:t>D</a:t>
+            </a:r>
+          </a:p>
+          <a:p>
+            <a:r>
+              <a:rPr lang="da-DK" dirty="0"/>
+              <a:t>E</a:t>
+            </a:r>
+            <a:endParaRPr lang="da-DK" dirty="0" smtClean="0"/>
+          </a:p>
+        </p:txBody>
+      </p:sp>
+      <p:sp>
+        <p:nvSpPr>
+          <p:cNvPr id="4" name="Pladsholder til sidefod 3"/>
+          <p:cNvSpPr>
+            <a:spLocks noGrp="1"/>
+          </p:cNvSpPr>
+          <p:nvPr>
+            <p:ph type="ftr" sz="quarter" idx="11"/>
+          </p:nvPr>
+        </p:nvSpPr>
+        <p:spPr/>
+        <p:txBody>
+          <a:bodyPr/>
+          <a:lstStyle/>
+          <a:p>
+            <a:r>
+              <a:rPr lang="da-DK" smtClean="0"/>
+              <a:t>I4SWD-01 Group 02</a:t>
+            </a:r>
+            <a:endParaRPr lang="da-DK"/>
+          </a:p>
+        </p:txBody>
+      </p:sp>
       <p:pic>
         <p:nvPicPr>
-          <p:cNvPr id="6" name="Billede 5"/>
+          <p:cNvPr id="5" name="Billede 4"/>
           <p:cNvPicPr>
             <a:picLocks noChangeAspect="1"/>
           </p:cNvPicPr>
@@ -3574,114 +3674,14 @@
         </p:blipFill>
         <p:spPr>
           <a:xfrm>
-            <a:off x="6251729" y="365125"/>
-            <a:ext cx="5597877" cy="3144127"/>
+            <a:off x="5595582" y="668030"/>
+            <a:ext cx="5990230" cy="3467073"/>
           </a:xfrm>
           <a:prstGeom prst="rect">
             <a:avLst/>
           </a:prstGeom>
         </p:spPr>
       </p:pic>
-      <p:sp>
-        <p:nvSpPr>
-          <p:cNvPr id="2" name="Titel 1"/>
-          <p:cNvSpPr>
-            <a:spLocks noGrp="1"/>
-          </p:cNvSpPr>
-          <p:nvPr>
-            <p:ph type="title"/>
-          </p:nvPr>
-        </p:nvSpPr>
-        <p:spPr/>
-        <p:txBody>
-          <a:bodyPr/>
-          <a:lstStyle/>
-          <a:p>
-            <a:r>
-              <a:rPr lang="da-DK" dirty="0" smtClean="0"/>
-              <a:t>Præsentation</a:t>
-            </a:r>
-            <a:endParaRPr lang="da-DK" dirty="0"/>
-          </a:p>
-        </p:txBody>
-      </p:sp>
-      <p:sp>
-        <p:nvSpPr>
-          <p:cNvPr id="3" name="Pladsholder til indhold 2"/>
-          <p:cNvSpPr>
-            <a:spLocks noGrp="1"/>
-          </p:cNvSpPr>
-          <p:nvPr>
-            <p:ph idx="1"/>
-          </p:nvPr>
-        </p:nvSpPr>
-        <p:spPr>
-          <a:xfrm>
-            <a:off x="838200" y="1690688"/>
-            <a:ext cx="4757382" cy="4351338"/>
-          </a:xfrm>
-        </p:spPr>
-        <p:txBody>
-          <a:bodyPr/>
-          <a:lstStyle/>
-          <a:p>
-            <a:r>
-              <a:rPr lang="da-DK" dirty="0" smtClean="0"/>
-              <a:t>Håndterer kommunikation mellem objekter</a:t>
-            </a:r>
-            <a:endParaRPr lang="da-DK" dirty="0" smtClean="0"/>
-          </a:p>
-          <a:p>
-            <a:r>
-              <a:rPr lang="da-DK" dirty="0" smtClean="0"/>
-              <a:t>Giver løs kobling</a:t>
-            </a:r>
-          </a:p>
-          <a:p>
-            <a:r>
-              <a:rPr lang="da-DK" dirty="0" smtClean="0"/>
-              <a:t>Objekterne kender ikke til hinanden</a:t>
-            </a:r>
-            <a:endParaRPr lang="da-DK" dirty="0" smtClean="0"/>
-          </a:p>
-          <a:p>
-            <a:r>
-              <a:rPr lang="da-DK" dirty="0" smtClean="0"/>
-              <a:t>D</a:t>
-            </a:r>
-          </a:p>
-          <a:p>
-            <a:r>
-              <a:rPr lang="da-DK" dirty="0"/>
-              <a:t>E</a:t>
-            </a:r>
-            <a:endParaRPr lang="da-DK" dirty="0" smtClean="0"/>
-          </a:p>
-        </p:txBody>
-      </p:sp>
-      <p:sp>
-        <p:nvSpPr>
-          <p:cNvPr id="4" name="Pladsholder til sidefod 3"/>
-          <p:cNvSpPr>
-            <a:spLocks noGrp="1"/>
-          </p:cNvSpPr>
-          <p:nvPr>
-            <p:ph type="ftr" sz="quarter" idx="11"/>
-          </p:nvPr>
-        </p:nvSpPr>
-        <p:spPr/>
-        <p:txBody>
-          <a:bodyPr/>
-          <a:lstStyle/>
-          <a:p>
-            <a:r>
-              <a:rPr lang="da-DK" smtClean="0"/>
-              <a:t>I4SWD-01 Group 02</a:t>
-            </a:r>
-            <a:endParaRPr lang="da-DK"/>
-          </a:p>
-        </p:txBody>
-      </p:sp>
     </p:spTree>
     <p:extLst>
       <p:ext uri="{BB962C8B-B14F-4D97-AF65-F5344CB8AC3E}">
@@ -3729,7 +3729,7 @@
           <a:p>
             <a:r>
               <a:rPr lang="da-DK" dirty="0" smtClean="0"/>
-              <a:t>Undersøgelse</a:t>
+              <a:t>Eksempel</a:t>
             </a:r>
             <a:endParaRPr lang="da-DK" dirty="0"/>
           </a:p>
@@ -3745,12 +3745,43 @@
             <p:ph idx="1"/>
           </p:nvPr>
         </p:nvSpPr>
-        <p:spPr/>
-        <p:txBody>
-          <a:bodyPr/>
-          <a:lstStyle/>
-          <a:p>
-            <a:endParaRPr lang="da-DK"/>
+        <p:spPr>
+          <a:xfrm>
+            <a:off x="838199" y="1825625"/>
+            <a:ext cx="4457132" cy="4351338"/>
+          </a:xfrm>
+        </p:spPr>
+        <p:txBody>
+          <a:bodyPr/>
+          <a:lstStyle/>
+          <a:p>
+            <a:r>
+              <a:rPr lang="da-DK" dirty="0" smtClean="0"/>
+              <a:t>Opsætning af </a:t>
+            </a:r>
+            <a:r>
+              <a:rPr lang="da-DK" dirty="0" err="1" smtClean="0"/>
+              <a:t>telefon-forbindelser</a:t>
+            </a:r>
+            <a:endParaRPr lang="da-DK" dirty="0" smtClean="0"/>
+          </a:p>
+          <a:p>
+            <a:r>
+              <a:rPr lang="da-DK" dirty="0" smtClean="0"/>
+              <a:t>Mange forbindelser – høj kobling</a:t>
+            </a:r>
+          </a:p>
+          <a:p>
+            <a:r>
+              <a:rPr lang="da-DK" dirty="0" smtClean="0"/>
+              <a:t>Tilføjelse af telefoner – koblingen stiger markant</a:t>
+            </a:r>
+          </a:p>
+          <a:p>
+            <a:endParaRPr lang="da-DK" dirty="0" smtClean="0"/>
+          </a:p>
+          <a:p>
+            <a:endParaRPr lang="da-DK" dirty="0"/>
           </a:p>
         </p:txBody>
       </p:sp>
@@ -3777,10 +3808,34 @@
           </a:p>
         </p:txBody>
       </p:sp>
+      <p:pic>
+        <p:nvPicPr>
+          <p:cNvPr id="6" name="Billede 5"/>
+          <p:cNvPicPr>
+            <a:picLocks noChangeAspect="1"/>
+          </p:cNvPicPr>
+          <p:nvPr/>
+        </p:nvPicPr>
+        <p:blipFill>
+          <a:blip r:embed="rId2"/>
+          <a:stretch>
+            <a:fillRect/>
+          </a:stretch>
+        </p:blipFill>
+        <p:spPr>
+          <a:xfrm>
+            <a:off x="6166990" y="584507"/>
+            <a:ext cx="5391526" cy="3632651"/>
+          </a:xfrm>
+          <a:prstGeom prst="rect">
+            <a:avLst/>
+          </a:prstGeom>
+        </p:spPr>
+      </p:pic>
     </p:spTree>
     <p:extLst>
       <p:ext uri="{BB962C8B-B14F-4D97-AF65-F5344CB8AC3E}">
-        <p14:creationId xmlns:p14="http://schemas.microsoft.com/office/powerpoint/2010/main" val="2227471305"/>
+        <p14:creationId xmlns:p14="http://schemas.microsoft.com/office/powerpoint/2010/main" val="2777025897"/>
       </p:ext>
     </p:extLst>
   </p:cSld>
@@ -3840,12 +3895,68 @@
             <p:ph idx="1"/>
           </p:nvPr>
         </p:nvSpPr>
-        <p:spPr/>
-        <p:txBody>
-          <a:bodyPr/>
-          <a:lstStyle/>
-          <a:p>
-            <a:endParaRPr lang="da-DK"/>
+        <p:spPr>
+          <a:xfrm>
+            <a:off x="838200" y="1825625"/>
+            <a:ext cx="4552666" cy="4351338"/>
+          </a:xfrm>
+        </p:spPr>
+        <p:txBody>
+          <a:bodyPr/>
+          <a:lstStyle/>
+          <a:p>
+            <a:r>
+              <a:rPr lang="da-DK" dirty="0" err="1" smtClean="0"/>
+              <a:t>PhoneCentral</a:t>
+            </a:r>
+            <a:r>
+              <a:rPr lang="da-DK" dirty="0" smtClean="0"/>
+              <a:t> introduceres som </a:t>
+            </a:r>
+            <a:r>
+              <a:rPr lang="da-DK" dirty="0" err="1" smtClean="0"/>
+              <a:t>Mediator</a:t>
+            </a:r>
+            <a:endParaRPr lang="da-DK" dirty="0" smtClean="0"/>
+          </a:p>
+          <a:p>
+            <a:r>
+              <a:rPr lang="da-DK" dirty="0" smtClean="0"/>
+              <a:t>Koblingen falder markant</a:t>
+            </a:r>
+          </a:p>
+          <a:p>
+            <a:r>
+              <a:rPr lang="da-DK" dirty="0" err="1" smtClean="0"/>
+              <a:t>PhoneCentral</a:t>
+            </a:r>
+            <a:r>
+              <a:rPr lang="da-DK" dirty="0" smtClean="0"/>
+              <a:t> </a:t>
+            </a:r>
+            <a:r>
+              <a:rPr lang="da-DK" dirty="0" err="1" smtClean="0"/>
+              <a:t>faciliterer</a:t>
+            </a:r>
+            <a:r>
+              <a:rPr lang="da-DK" dirty="0" smtClean="0"/>
+              <a:t> al kommunikation</a:t>
+            </a:r>
+          </a:p>
+          <a:p>
+            <a:r>
+              <a:rPr lang="da-DK" dirty="0" smtClean="0"/>
+              <a:t>Intet problem, hvis en telefon fjernes </a:t>
+            </a:r>
+          </a:p>
+          <a:p>
+            <a:endParaRPr lang="da-DK" dirty="0" smtClean="0"/>
+          </a:p>
+          <a:p>
+            <a:endParaRPr lang="da-DK" dirty="0" smtClean="0"/>
+          </a:p>
+          <a:p>
+            <a:endParaRPr lang="da-DK" dirty="0"/>
           </a:p>
         </p:txBody>
       </p:sp>
@@ -3872,10 +3983,34 @@
           </a:p>
         </p:txBody>
       </p:sp>
+      <p:pic>
+        <p:nvPicPr>
+          <p:cNvPr id="5" name="Billede 4"/>
+          <p:cNvPicPr>
+            <a:picLocks noChangeAspect="1"/>
+          </p:cNvPicPr>
+          <p:nvPr/>
+        </p:nvPicPr>
+        <p:blipFill>
+          <a:blip r:embed="rId2"/>
+          <a:stretch>
+            <a:fillRect/>
+          </a:stretch>
+        </p:blipFill>
+        <p:spPr>
+          <a:xfrm>
+            <a:off x="6099587" y="525507"/>
+            <a:ext cx="5524611" cy="3705299"/>
+          </a:xfrm>
+          <a:prstGeom prst="rect">
+            <a:avLst/>
+          </a:prstGeom>
+        </p:spPr>
+      </p:pic>
     </p:spTree>
     <p:extLst>
       <p:ext uri="{BB962C8B-B14F-4D97-AF65-F5344CB8AC3E}">
-        <p14:creationId xmlns:p14="http://schemas.microsoft.com/office/powerpoint/2010/main" val="2777025897"/>
+        <p14:creationId xmlns:p14="http://schemas.microsoft.com/office/powerpoint/2010/main" val="398657882"/>
       </p:ext>
     </p:extLst>
   </p:cSld>
@@ -3886,6 +4021,214 @@
 </file>
 
 <file path=ppt/slides/slide5.xml><?xml version="1.0" encoding="utf-8"?>
+<p:sld xmlns:a="http://schemas.openxmlformats.org/drawingml/2006/main" xmlns:r="http://schemas.openxmlformats.org/officeDocument/2006/relationships" xmlns:p="http://schemas.openxmlformats.org/presentationml/2006/main">
+  <p:cSld>
+    <p:spTree>
+      <p:nvGrpSpPr>
+        <p:cNvPr id="1" name=""/>
+        <p:cNvGrpSpPr/>
+        <p:nvPr/>
+      </p:nvGrpSpPr>
+      <p:grpSpPr>
+        <a:xfrm>
+          <a:off x="0" y="0"/>
+          <a:ext cx="0" cy="0"/>
+          <a:chOff x="0" y="0"/>
+          <a:chExt cx="0" cy="0"/>
+        </a:xfrm>
+      </p:grpSpPr>
+      <p:sp>
+        <p:nvSpPr>
+          <p:cNvPr id="2" name="Titel 1"/>
+          <p:cNvSpPr>
+            <a:spLocks noGrp="1"/>
+          </p:cNvSpPr>
+          <p:nvPr>
+            <p:ph type="title"/>
+          </p:nvPr>
+        </p:nvSpPr>
+        <p:spPr/>
+        <p:txBody>
+          <a:bodyPr/>
+          <a:lstStyle/>
+          <a:p>
+            <a:r>
+              <a:rPr lang="da-DK" dirty="0" smtClean="0"/>
+              <a:t>Eksempel</a:t>
+            </a:r>
+            <a:endParaRPr lang="da-DK" dirty="0"/>
+          </a:p>
+        </p:txBody>
+      </p:sp>
+      <p:sp>
+        <p:nvSpPr>
+          <p:cNvPr id="3" name="Pladsholder til indhold 2"/>
+          <p:cNvSpPr>
+            <a:spLocks noGrp="1"/>
+          </p:cNvSpPr>
+          <p:nvPr>
+            <p:ph idx="1"/>
+          </p:nvPr>
+        </p:nvSpPr>
+        <p:spPr>
+          <a:xfrm>
+            <a:off x="838200" y="1825625"/>
+            <a:ext cx="4470779" cy="4351338"/>
+          </a:xfrm>
+        </p:spPr>
+        <p:txBody>
+          <a:bodyPr/>
+          <a:lstStyle/>
+          <a:p>
+            <a:r>
+              <a:rPr lang="da-DK" smtClean="0"/>
+              <a:t>Vores kode</a:t>
+            </a:r>
+            <a:endParaRPr lang="da-DK" dirty="0"/>
+          </a:p>
+        </p:txBody>
+      </p:sp>
+      <p:sp>
+        <p:nvSpPr>
+          <p:cNvPr id="4" name="Pladsholder til sidefod 3"/>
+          <p:cNvSpPr>
+            <a:spLocks noGrp="1"/>
+          </p:cNvSpPr>
+          <p:nvPr>
+            <p:ph type="ftr" sz="quarter" idx="11"/>
+          </p:nvPr>
+        </p:nvSpPr>
+        <p:spPr/>
+        <p:txBody>
+          <a:bodyPr/>
+          <a:lstStyle/>
+          <a:p>
+            <a:r>
+              <a:rPr lang="da-DK" smtClean="0"/>
+              <a:t>I4SWD-01 Group 02</a:t>
+            </a:r>
+            <a:endParaRPr lang="da-DK"/>
+          </a:p>
+        </p:txBody>
+      </p:sp>
+    </p:spTree>
+    <p:extLst>
+      <p:ext uri="{BB962C8B-B14F-4D97-AF65-F5344CB8AC3E}">
+        <p14:creationId xmlns:p14="http://schemas.microsoft.com/office/powerpoint/2010/main" val="504245877"/>
+      </p:ext>
+    </p:extLst>
+  </p:cSld>
+  <p:clrMapOvr>
+    <a:masterClrMapping/>
+  </p:clrMapOvr>
+</p:sld>
+</file>
+
+<file path=ppt/slides/slide6.xml><?xml version="1.0" encoding="utf-8"?>
+<p:sld xmlns:a="http://schemas.openxmlformats.org/drawingml/2006/main" xmlns:r="http://schemas.openxmlformats.org/officeDocument/2006/relationships" xmlns:p="http://schemas.openxmlformats.org/presentationml/2006/main">
+  <p:cSld>
+    <p:spTree>
+      <p:nvGrpSpPr>
+        <p:cNvPr id="1" name=""/>
+        <p:cNvGrpSpPr/>
+        <p:nvPr/>
+      </p:nvGrpSpPr>
+      <p:grpSpPr>
+        <a:xfrm>
+          <a:off x="0" y="0"/>
+          <a:ext cx="0" cy="0"/>
+          <a:chOff x="0" y="0"/>
+          <a:chExt cx="0" cy="0"/>
+        </a:xfrm>
+      </p:grpSpPr>
+      <p:sp>
+        <p:nvSpPr>
+          <p:cNvPr id="2" name="Titel 1"/>
+          <p:cNvSpPr>
+            <a:spLocks noGrp="1"/>
+          </p:cNvSpPr>
+          <p:nvPr>
+            <p:ph type="title"/>
+          </p:nvPr>
+        </p:nvSpPr>
+        <p:spPr/>
+        <p:txBody>
+          <a:bodyPr/>
+          <a:lstStyle/>
+          <a:p>
+            <a:r>
+              <a:rPr lang="da-DK" dirty="0" smtClean="0"/>
+              <a:t>Sammenligning</a:t>
+            </a:r>
+            <a:endParaRPr lang="da-DK" dirty="0"/>
+          </a:p>
+        </p:txBody>
+      </p:sp>
+      <p:sp>
+        <p:nvSpPr>
+          <p:cNvPr id="3" name="Pladsholder til indhold 2"/>
+          <p:cNvSpPr>
+            <a:spLocks noGrp="1"/>
+          </p:cNvSpPr>
+          <p:nvPr>
+            <p:ph idx="1"/>
+          </p:nvPr>
+        </p:nvSpPr>
+        <p:spPr>
+          <a:xfrm>
+            <a:off x="838200" y="1825625"/>
+            <a:ext cx="3542731" cy="4351338"/>
+          </a:xfrm>
+        </p:spPr>
+        <p:txBody>
+          <a:bodyPr/>
+          <a:lstStyle/>
+          <a:p>
+            <a:r>
+              <a:rPr lang="da-DK" dirty="0" smtClean="0"/>
+              <a:t>Observer</a:t>
+            </a:r>
+            <a:endParaRPr lang="da-DK" dirty="0"/>
+          </a:p>
+        </p:txBody>
+      </p:sp>
+      <p:sp>
+        <p:nvSpPr>
+          <p:cNvPr id="4" name="Pladsholder til sidefod 3"/>
+          <p:cNvSpPr>
+            <a:spLocks noGrp="1"/>
+          </p:cNvSpPr>
+          <p:nvPr>
+            <p:ph type="ftr" sz="quarter" idx="11"/>
+          </p:nvPr>
+        </p:nvSpPr>
+        <p:spPr/>
+        <p:txBody>
+          <a:bodyPr/>
+          <a:lstStyle/>
+          <a:p>
+            <a:r>
+              <a:rPr lang="da-DK" smtClean="0"/>
+              <a:t>I4SWD-01 Group 02</a:t>
+            </a:r>
+            <a:endParaRPr lang="da-DK"/>
+          </a:p>
+        </p:txBody>
+      </p:sp>
+    </p:spTree>
+    <p:extLst>
+      <p:ext uri="{BB962C8B-B14F-4D97-AF65-F5344CB8AC3E}">
+        <p14:creationId xmlns:p14="http://schemas.microsoft.com/office/powerpoint/2010/main" val="1745786862"/>
+      </p:ext>
+    </p:extLst>
+  </p:cSld>
+  <p:clrMapOvr>
+    <a:masterClrMapping/>
+  </p:clrMapOvr>
+</p:sld>
+</file>
+
+<file path=ppt/slides/slide7.xml><?xml version="1.0" encoding="utf-8"?>
 <p:sld xmlns:a="http://schemas.openxmlformats.org/drawingml/2006/main" xmlns:r="http://schemas.openxmlformats.org/officeDocument/2006/relationships" xmlns:p="http://schemas.openxmlformats.org/presentationml/2006/main">
   <p:cSld>
     <p:spTree>

</xml_diff>

<commit_message>
Dokumenter og diagrammer opdateret
</commit_message>
<xml_diff>
--- a/F17-I4SWD-AfsluttendeOpgaveGruppe02-Mediator-presenstation.pptx
+++ b/F17-I4SWD-AfsluttendeOpgaveGruppe02-Mediator-presenstation.pptx
@@ -3596,7 +3596,7 @@
         <p:spPr>
           <a:xfrm>
             <a:off x="838200" y="1690688"/>
-            <a:ext cx="4757382" cy="4351338"/>
+            <a:ext cx="4416188" cy="4351338"/>
           </a:xfrm>
         </p:spPr>
         <p:txBody>
@@ -3620,19 +3620,6 @@
               <a:t>Objekterne kender ikke til hinanden</a:t>
             </a:r>
           </a:p>
-          <a:p>
-            <a:r>
-              <a:rPr lang="da-DK" dirty="0" smtClean="0"/>
-              <a:t>D</a:t>
-            </a:r>
-          </a:p>
-          <a:p>
-            <a:r>
-              <a:rPr lang="da-DK" dirty="0"/>
-              <a:t>E</a:t>
-            </a:r>
-            <a:endParaRPr lang="da-DK" dirty="0" smtClean="0"/>
-          </a:p>
         </p:txBody>
       </p:sp>
       <p:sp>
@@ -3660,7 +3647,7 @@
       </p:sp>
       <p:pic>
         <p:nvPicPr>
-          <p:cNvPr id="6" name="Billede 5"/>
+          <p:cNvPr id="5" name="Billede 4"/>
           <p:cNvPicPr>
             <a:picLocks noChangeAspect="1"/>
           </p:cNvPicPr>
@@ -3674,8 +3661,8 @@
         </p:blipFill>
         <p:spPr>
           <a:xfrm>
-            <a:off x="5431027" y="921261"/>
-            <a:ext cx="5444745" cy="3293326"/>
+            <a:off x="5782029" y="1690688"/>
+            <a:ext cx="5895975" cy="3305175"/>
           </a:xfrm>
           <a:prstGeom prst="rect">
             <a:avLst/>
@@ -3824,7 +3811,7 @@
         </p:blipFill>
         <p:spPr>
           <a:xfrm>
-            <a:off x="6166990" y="584507"/>
+            <a:off x="5784852" y="1457964"/>
             <a:ext cx="5391526" cy="3632651"/>
           </a:xfrm>
           <a:prstGeom prst="rect">
@@ -3999,7 +3986,7 @@
         </p:blipFill>
         <p:spPr>
           <a:xfrm>
-            <a:off x="6099587" y="525507"/>
+            <a:off x="5829189" y="1562737"/>
             <a:ext cx="5524611" cy="3705299"/>
           </a:xfrm>
           <a:prstGeom prst="rect">
@@ -4073,7 +4060,7 @@
         <p:spPr>
           <a:xfrm>
             <a:off x="838200" y="1825625"/>
-            <a:ext cx="4470779" cy="4351338"/>
+            <a:ext cx="3911221" cy="4351338"/>
           </a:xfrm>
         </p:spPr>
         <p:txBody>
@@ -4081,8 +4068,8 @@
           <a:lstStyle/>
           <a:p>
             <a:r>
-              <a:rPr lang="da-DK" smtClean="0"/>
-              <a:t>Vores kode</a:t>
+              <a:rPr lang="da-DK" dirty="0" smtClean="0"/>
+              <a:t>Anvendt eksempel</a:t>
             </a:r>
             <a:endParaRPr lang="da-DK" dirty="0"/>
           </a:p>
@@ -4176,17 +4163,39 @@
         </p:nvSpPr>
         <p:spPr>
           <a:xfrm>
-            <a:off x="838200" y="1825625"/>
-            <a:ext cx="3542731" cy="4351338"/>
+            <a:off x="6382034" y="1690688"/>
+            <a:ext cx="4836426" cy="4351338"/>
           </a:xfrm>
         </p:spPr>
         <p:txBody>
           <a:bodyPr/>
           <a:lstStyle/>
           <a:p>
+            <a:pPr marL="0" indent="0">
+              <a:buNone/>
+            </a:pPr>
+            <a:r>
+              <a:rPr lang="da-DK" b="1" dirty="0" smtClean="0"/>
+              <a:t>Observer</a:t>
+            </a:r>
+          </a:p>
+          <a:p>
             <a:r>
               <a:rPr lang="da-DK" dirty="0" smtClean="0"/>
-              <a:t>Observer</a:t>
+              <a:t>A</a:t>
+            </a:r>
+          </a:p>
+          <a:p>
+            <a:r>
+              <a:rPr lang="da-DK" dirty="0" smtClean="0"/>
+              <a:t>B</a:t>
+            </a:r>
+            <a:br>
+              <a:rPr lang="da-DK" dirty="0" smtClean="0"/>
+            </a:br>
+            <a:r>
+              <a:rPr lang="da-DK" dirty="0" smtClean="0"/>
+              <a:t>C</a:t>
             </a:r>
             <a:endParaRPr lang="da-DK" dirty="0"/>
           </a:p>
@@ -4212,6 +4221,222 @@
               <a:t>I4SWD-01 Group 02</a:t>
             </a:r>
             <a:endParaRPr lang="da-DK"/>
+          </a:p>
+        </p:txBody>
+      </p:sp>
+      <p:sp>
+        <p:nvSpPr>
+          <p:cNvPr id="6" name="Pladsholder til indhold 2"/>
+          <p:cNvSpPr txBox="1">
+            <a:spLocks/>
+          </p:cNvSpPr>
+          <p:nvPr/>
+        </p:nvSpPr>
+        <p:spPr>
+          <a:xfrm>
+            <a:off x="838200" y="1690688"/>
+            <a:ext cx="4402540" cy="4351338"/>
+          </a:xfrm>
+          <a:prstGeom prst="rect">
+            <a:avLst/>
+          </a:prstGeom>
+        </p:spPr>
+        <p:txBody>
+          <a:bodyPr vert="horz" lIns="91440" tIns="45720" rIns="91440" bIns="45720" rtlCol="0">
+            <a:normAutofit/>
+          </a:bodyPr>
+          <a:lstStyle>
+            <a:lvl1pPr marL="228600" indent="-228600" algn="l" defTabSz="914400" rtl="0" eaLnBrk="1" latinLnBrk="0" hangingPunct="1">
+              <a:lnSpc>
+                <a:spcPct val="90000"/>
+              </a:lnSpc>
+              <a:spcBef>
+                <a:spcPts val="1000"/>
+              </a:spcBef>
+              <a:buFont typeface="Arial" panose="020B0604020202020204" pitchFamily="34" charset="0"/>
+              <a:buChar char="•"/>
+              <a:defRPr sz="2800" kern="1200">
+                <a:solidFill>
+                  <a:schemeClr val="tx1"/>
+                </a:solidFill>
+                <a:latin typeface="+mn-lt"/>
+                <a:ea typeface="+mn-ea"/>
+                <a:cs typeface="+mn-cs"/>
+              </a:defRPr>
+            </a:lvl1pPr>
+            <a:lvl2pPr marL="685800" indent="-228600" algn="l" defTabSz="914400" rtl="0" eaLnBrk="1" latinLnBrk="0" hangingPunct="1">
+              <a:lnSpc>
+                <a:spcPct val="90000"/>
+              </a:lnSpc>
+              <a:spcBef>
+                <a:spcPts val="500"/>
+              </a:spcBef>
+              <a:buFont typeface="Arial" panose="020B0604020202020204" pitchFamily="34" charset="0"/>
+              <a:buChar char="•"/>
+              <a:defRPr sz="2400" kern="1200">
+                <a:solidFill>
+                  <a:schemeClr val="tx1"/>
+                </a:solidFill>
+                <a:latin typeface="+mn-lt"/>
+                <a:ea typeface="+mn-ea"/>
+                <a:cs typeface="+mn-cs"/>
+              </a:defRPr>
+            </a:lvl2pPr>
+            <a:lvl3pPr marL="1143000" indent="-228600" algn="l" defTabSz="914400" rtl="0" eaLnBrk="1" latinLnBrk="0" hangingPunct="1">
+              <a:lnSpc>
+                <a:spcPct val="90000"/>
+              </a:lnSpc>
+              <a:spcBef>
+                <a:spcPts val="500"/>
+              </a:spcBef>
+              <a:buFont typeface="Arial" panose="020B0604020202020204" pitchFamily="34" charset="0"/>
+              <a:buChar char="•"/>
+              <a:defRPr sz="2000" kern="1200">
+                <a:solidFill>
+                  <a:schemeClr val="tx1"/>
+                </a:solidFill>
+                <a:latin typeface="+mn-lt"/>
+                <a:ea typeface="+mn-ea"/>
+                <a:cs typeface="+mn-cs"/>
+              </a:defRPr>
+            </a:lvl3pPr>
+            <a:lvl4pPr marL="1600200" indent="-228600" algn="l" defTabSz="914400" rtl="0" eaLnBrk="1" latinLnBrk="0" hangingPunct="1">
+              <a:lnSpc>
+                <a:spcPct val="90000"/>
+              </a:lnSpc>
+              <a:spcBef>
+                <a:spcPts val="500"/>
+              </a:spcBef>
+              <a:buFont typeface="Arial" panose="020B0604020202020204" pitchFamily="34" charset="0"/>
+              <a:buChar char="•"/>
+              <a:defRPr sz="1800" kern="1200">
+                <a:solidFill>
+                  <a:schemeClr val="tx1"/>
+                </a:solidFill>
+                <a:latin typeface="+mn-lt"/>
+                <a:ea typeface="+mn-ea"/>
+                <a:cs typeface="+mn-cs"/>
+              </a:defRPr>
+            </a:lvl4pPr>
+            <a:lvl5pPr marL="2057400" indent="-228600" algn="l" defTabSz="914400" rtl="0" eaLnBrk="1" latinLnBrk="0" hangingPunct="1">
+              <a:lnSpc>
+                <a:spcPct val="90000"/>
+              </a:lnSpc>
+              <a:spcBef>
+                <a:spcPts val="500"/>
+              </a:spcBef>
+              <a:buFont typeface="Arial" panose="020B0604020202020204" pitchFamily="34" charset="0"/>
+              <a:buChar char="•"/>
+              <a:defRPr sz="1800" kern="1200">
+                <a:solidFill>
+                  <a:schemeClr val="tx1"/>
+                </a:solidFill>
+                <a:latin typeface="+mn-lt"/>
+                <a:ea typeface="+mn-ea"/>
+                <a:cs typeface="+mn-cs"/>
+              </a:defRPr>
+            </a:lvl5pPr>
+            <a:lvl6pPr marL="2514600" indent="-228600" algn="l" defTabSz="914400" rtl="0" eaLnBrk="1" latinLnBrk="0" hangingPunct="1">
+              <a:lnSpc>
+                <a:spcPct val="90000"/>
+              </a:lnSpc>
+              <a:spcBef>
+                <a:spcPts val="500"/>
+              </a:spcBef>
+              <a:buFont typeface="Arial" panose="020B0604020202020204" pitchFamily="34" charset="0"/>
+              <a:buChar char="•"/>
+              <a:defRPr sz="1800" kern="1200">
+                <a:solidFill>
+                  <a:schemeClr val="tx1"/>
+                </a:solidFill>
+                <a:latin typeface="+mn-lt"/>
+                <a:ea typeface="+mn-ea"/>
+                <a:cs typeface="+mn-cs"/>
+              </a:defRPr>
+            </a:lvl6pPr>
+            <a:lvl7pPr marL="2971800" indent="-228600" algn="l" defTabSz="914400" rtl="0" eaLnBrk="1" latinLnBrk="0" hangingPunct="1">
+              <a:lnSpc>
+                <a:spcPct val="90000"/>
+              </a:lnSpc>
+              <a:spcBef>
+                <a:spcPts val="500"/>
+              </a:spcBef>
+              <a:buFont typeface="Arial" panose="020B0604020202020204" pitchFamily="34" charset="0"/>
+              <a:buChar char="•"/>
+              <a:defRPr sz="1800" kern="1200">
+                <a:solidFill>
+                  <a:schemeClr val="tx1"/>
+                </a:solidFill>
+                <a:latin typeface="+mn-lt"/>
+                <a:ea typeface="+mn-ea"/>
+                <a:cs typeface="+mn-cs"/>
+              </a:defRPr>
+            </a:lvl7pPr>
+            <a:lvl8pPr marL="3429000" indent="-228600" algn="l" defTabSz="914400" rtl="0" eaLnBrk="1" latinLnBrk="0" hangingPunct="1">
+              <a:lnSpc>
+                <a:spcPct val="90000"/>
+              </a:lnSpc>
+              <a:spcBef>
+                <a:spcPts val="500"/>
+              </a:spcBef>
+              <a:buFont typeface="Arial" panose="020B0604020202020204" pitchFamily="34" charset="0"/>
+              <a:buChar char="•"/>
+              <a:defRPr sz="1800" kern="1200">
+                <a:solidFill>
+                  <a:schemeClr val="tx1"/>
+                </a:solidFill>
+                <a:latin typeface="+mn-lt"/>
+                <a:ea typeface="+mn-ea"/>
+                <a:cs typeface="+mn-cs"/>
+              </a:defRPr>
+            </a:lvl8pPr>
+            <a:lvl9pPr marL="3886200" indent="-228600" algn="l" defTabSz="914400" rtl="0" eaLnBrk="1" latinLnBrk="0" hangingPunct="1">
+              <a:lnSpc>
+                <a:spcPct val="90000"/>
+              </a:lnSpc>
+              <a:spcBef>
+                <a:spcPts val="500"/>
+              </a:spcBef>
+              <a:buFont typeface="Arial" panose="020B0604020202020204" pitchFamily="34" charset="0"/>
+              <a:buChar char="•"/>
+              <a:defRPr sz="1800" kern="1200">
+                <a:solidFill>
+                  <a:schemeClr val="tx1"/>
+                </a:solidFill>
+                <a:latin typeface="+mn-lt"/>
+                <a:ea typeface="+mn-ea"/>
+                <a:cs typeface="+mn-cs"/>
+              </a:defRPr>
+            </a:lvl9pPr>
+          </a:lstStyle>
+          <a:p>
+            <a:pPr marL="0" indent="0">
+              <a:buNone/>
+            </a:pPr>
+            <a:r>
+              <a:rPr lang="da-DK" b="1" dirty="0" smtClean="0"/>
+              <a:t>Mediator</a:t>
+            </a:r>
+          </a:p>
+          <a:p>
+            <a:r>
+              <a:rPr lang="da-DK" dirty="0" smtClean="0"/>
+              <a:t>A</a:t>
+            </a:r>
+          </a:p>
+          <a:p>
+            <a:r>
+              <a:rPr lang="da-DK" dirty="0" smtClean="0"/>
+              <a:t>B</a:t>
+            </a:r>
+            <a:br>
+              <a:rPr lang="da-DK" dirty="0" smtClean="0"/>
+            </a:br>
+            <a:r>
+              <a:rPr lang="da-DK" dirty="0" smtClean="0"/>
+              <a:t>C</a:t>
+            </a:r>
+            <a:endParaRPr lang="da-DK" dirty="0"/>
           </a:p>
         </p:txBody>
       </p:sp>

</xml_diff>

<commit_message>
Rapport og PP DONE
</commit_message>
<xml_diff>
--- a/F17-I4SWD-AfsluttendeOpgaveGruppe02-Mediator-presenstation.pptx
+++ b/F17-I4SWD-AfsluttendeOpgaveGruppe02-Mediator-presenstation.pptx
@@ -4646,7 +4646,6 @@
               <a:rPr lang="da-DK" dirty="0" smtClean="0"/>
               <a:t>Specificitet</a:t>
             </a:r>
-            <a:endParaRPr lang="da-DK" dirty="0" smtClean="0"/>
           </a:p>
         </p:txBody>
       </p:sp>
@@ -4847,11 +4846,7 @@
           <a:p>
             <a:r>
               <a:rPr lang="da-DK" dirty="0" smtClean="0"/>
-              <a:t>Open/Close </a:t>
-            </a:r>
-            <a:r>
-              <a:rPr lang="da-DK" dirty="0" smtClean="0"/>
-              <a:t>opfyldes</a:t>
+              <a:t>Open/Close opfyldes</a:t>
             </a:r>
           </a:p>
           <a:p>

</xml_diff>